<commit_message>
added the testing slides
</commit_message>
<xml_diff>
--- a/SupportingDocuments/ReLocate.pptx
+++ b/SupportingDocuments/ReLocate.pptx
@@ -5,10 +5,10 @@
     <p:sldMasterId id="2147483648" r:id="rId4"/>
   </p:sldMasterIdLst>
   <p:notesMasterIdLst>
-    <p:notesMasterId r:id="rId19"/>
+    <p:notesMasterId r:id="rId20"/>
   </p:notesMasterIdLst>
   <p:handoutMasterIdLst>
-    <p:handoutMasterId r:id="rId20"/>
+    <p:handoutMasterId r:id="rId21"/>
   </p:handoutMasterIdLst>
   <p:sldIdLst>
     <p:sldId id="265" r:id="rId5"/>
@@ -23,13 +23,14 @@
     <p:sldId id="324" r:id="rId14"/>
     <p:sldId id="325" r:id="rId15"/>
     <p:sldId id="326" r:id="rId16"/>
-    <p:sldId id="329" r:id="rId17"/>
-    <p:sldId id="330" r:id="rId18"/>
+    <p:sldId id="331" r:id="rId17"/>
+    <p:sldId id="329" r:id="rId18"/>
+    <p:sldId id="330" r:id="rId19"/>
   </p:sldIdLst>
   <p:sldSz cx="12188825" cy="6858000"/>
   <p:notesSz cx="6858000" cy="9144000"/>
   <p:custDataLst>
-    <p:tags r:id="rId21"/>
+    <p:tags r:id="rId22"/>
   </p:custDataLst>
   <p:defaultTextStyle>
     <a:defPPr>
@@ -128,7 +129,7 @@
   </p:defaultTextStyle>
   <p:extLst>
     <p:ext uri="{EFAFB233-063F-42B5-8137-9DF3F51BA10A}">
-      <p15:sldGuideLst xmlns:p15="http://schemas.microsoft.com/office/powerpoint/2012/main" xmlns="">
+      <p15:sldGuideLst xmlns:p15="http://schemas.microsoft.com/office/powerpoint/2012/main">
         <p15:guide id="1" pos="3839" userDrawn="1">
           <p15:clr>
             <a:srgbClr val="A4A3A4"/>
@@ -142,7 +143,7 @@
       </p15:sldGuideLst>
     </p:ext>
     <p:ext uri="{2D200454-40CA-4A62-9FC3-DE9A4176ACB9}">
-      <p15:notesGuideLst xmlns:p15="http://schemas.microsoft.com/office/powerpoint/2012/main" xmlns=""/>
+      <p15:notesGuideLst xmlns:p15="http://schemas.microsoft.com/office/powerpoint/2012/main"/>
     </p:ext>
   </p:extLst>
 </p:presentation>
@@ -231,7 +232,7 @@
             <a:fld id="{59088EAF-6ECA-4616-85EF-35AA19C641F3}" type="datetimeFigureOut">
               <a:rPr lang="en-US"/>
               <a:pPr/>
-              <a:t>4/3/2017</a:t>
+              <a:t>4/4/2017</a:t>
             </a:fld>
             <a:endParaRPr/>
           </a:p>
@@ -307,7 +308,7 @@
     </p:spTree>
     <p:extLst>
       <p:ext uri="{BB962C8B-B14F-4D97-AF65-F5344CB8AC3E}">
-        <p14:creationId xmlns:p14="http://schemas.microsoft.com/office/powerpoint/2010/main" xmlns="" val="3932065745"/>
+        <p14:creationId xmlns:p14="http://schemas.microsoft.com/office/powerpoint/2010/main" val="3932065745"/>
       </p:ext>
     </p:extLst>
   </p:cSld>
@@ -462,35 +463,30 @@
           <a:p>
             <a:pPr lvl="0"/>
             <a:r>
-              <a:rPr/>
               <a:t>Click to edit Master text styles</a:t>
             </a:r>
           </a:p>
           <a:p>
             <a:pPr lvl="1"/>
             <a:r>
-              <a:rPr/>
               <a:t>Second level</a:t>
             </a:r>
           </a:p>
           <a:p>
             <a:pPr lvl="2"/>
             <a:r>
-              <a:rPr/>
               <a:t>Third level</a:t>
             </a:r>
           </a:p>
           <a:p>
             <a:pPr lvl="3"/>
             <a:r>
-              <a:rPr/>
               <a:t>Fourth level</a:t>
             </a:r>
           </a:p>
           <a:p>
             <a:pPr lvl="4"/>
             <a:r>
-              <a:rPr/>
               <a:t>Fifth level</a:t>
             </a:r>
           </a:p>
@@ -566,7 +562,7 @@
     </p:spTree>
     <p:extLst>
       <p:ext uri="{BB962C8B-B14F-4D97-AF65-F5344CB8AC3E}">
-        <p14:creationId xmlns:p14="http://schemas.microsoft.com/office/powerpoint/2010/main" xmlns="" val="4276579820"/>
+        <p14:creationId xmlns:p14="http://schemas.microsoft.com/office/powerpoint/2010/main" val="4276579820"/>
       </p:ext>
     </p:extLst>
   </p:cSld>
@@ -731,7 +727,7 @@
           </a:lstStyle>
           <a:p>
             <a:r>
-              <a:rPr lang="en-US" smtClean="0"/>
+              <a:rPr lang="en-US"/>
               <a:t>Click to edit Master title style</a:t>
             </a:r>
             <a:endParaRPr/>
@@ -853,7 +849,7 @@
           </a:lstStyle>
           <a:p>
             <a:r>
-              <a:rPr lang="en-US" smtClean="0"/>
+              <a:rPr lang="en-US"/>
               <a:t>Click to edit Master subtitle style</a:t>
             </a:r>
             <a:endParaRPr/>
@@ -863,20 +859,20 @@
     </p:spTree>
     <p:extLst>
       <p:ext uri="{BB962C8B-B14F-4D97-AF65-F5344CB8AC3E}">
-        <p14:creationId xmlns:p14="http://schemas.microsoft.com/office/powerpoint/2010/main" xmlns="" val="94999051"/>
+        <p14:creationId xmlns:p14="http://schemas.microsoft.com/office/powerpoint/2010/main" val="94999051"/>
       </p:ext>
     </p:extLst>
   </p:cSld>
   <p:clrMapOvr>
     <a:masterClrMapping/>
   </p:clrMapOvr>
-  <mc:AlternateContent xmlns:mc="http://schemas.openxmlformats.org/markup-compatibility/2006">
-    <mc:Choice xmlns:p14="http://schemas.microsoft.com/office/powerpoint/2010/main" xmlns="" Requires="p14">
+  <mc:AlternateContent xmlns:mc="http://schemas.openxmlformats.org/markup-compatibility/2006" xmlns:p14="http://schemas.microsoft.com/office/powerpoint/2010/main">
+    <mc:Choice Requires="p14">
       <p:transition spd="med" p14:dur="700">
         <p:fade/>
       </p:transition>
     </mc:Choice>
-    <mc:Fallback>
+    <mc:Fallback xmlns="">
       <p:transition spd="med">
         <p:fade/>
       </p:transition>
@@ -918,7 +914,7 @@
           <a:lstStyle/>
           <a:p>
             <a:r>
-              <a:rPr lang="en-US" smtClean="0"/>
+              <a:rPr lang="en-US"/>
               <a:t>Click to edit Master title style</a:t>
             </a:r>
             <a:endParaRPr/>
@@ -942,35 +938,35 @@
           <a:p>
             <a:pPr lvl="0"/>
             <a:r>
-              <a:rPr lang="en-US" smtClean="0"/>
+              <a:rPr lang="en-US"/>
               <a:t>Click to edit Master text styles</a:t>
             </a:r>
           </a:p>
           <a:p>
             <a:pPr lvl="1"/>
             <a:r>
-              <a:rPr lang="en-US" smtClean="0"/>
+              <a:rPr lang="en-US"/>
               <a:t>Second level</a:t>
             </a:r>
           </a:p>
           <a:p>
             <a:pPr lvl="2"/>
             <a:r>
-              <a:rPr lang="en-US" smtClean="0"/>
+              <a:rPr lang="en-US"/>
               <a:t>Third level</a:t>
             </a:r>
           </a:p>
           <a:p>
             <a:pPr lvl="3"/>
             <a:r>
-              <a:rPr lang="en-US" smtClean="0"/>
+              <a:rPr lang="en-US"/>
               <a:t>Fourth level</a:t>
             </a:r>
           </a:p>
           <a:p>
             <a:pPr lvl="4"/>
             <a:r>
-              <a:rPr lang="en-US" smtClean="0"/>
+              <a:rPr lang="en-US"/>
               <a:t>Fifth level</a:t>
             </a:r>
             <a:endParaRPr/>
@@ -1047,20 +1043,20 @@
     </p:spTree>
     <p:extLst>
       <p:ext uri="{BB962C8B-B14F-4D97-AF65-F5344CB8AC3E}">
-        <p14:creationId xmlns:p14="http://schemas.microsoft.com/office/powerpoint/2010/main" xmlns="" val="460095310"/>
+        <p14:creationId xmlns:p14="http://schemas.microsoft.com/office/powerpoint/2010/main" val="460095310"/>
       </p:ext>
     </p:extLst>
   </p:cSld>
   <p:clrMapOvr>
     <a:masterClrMapping/>
   </p:clrMapOvr>
-  <mc:AlternateContent xmlns:mc="http://schemas.openxmlformats.org/markup-compatibility/2006">
-    <mc:Choice xmlns:p14="http://schemas.microsoft.com/office/powerpoint/2010/main" xmlns="" Requires="p14">
+  <mc:AlternateContent xmlns:mc="http://schemas.openxmlformats.org/markup-compatibility/2006" xmlns:p14="http://schemas.microsoft.com/office/powerpoint/2010/main">
+    <mc:Choice Requires="p14">
       <p:transition spd="med" p14:dur="700">
         <p:fade/>
       </p:transition>
     </mc:Choice>
-    <mc:Fallback>
+    <mc:Fallback xmlns="">
       <p:transition spd="med">
         <p:fade/>
       </p:transition>
@@ -1107,7 +1103,7 @@
           <a:lstStyle/>
           <a:p>
             <a:r>
-              <a:rPr lang="en-US" smtClean="0"/>
+              <a:rPr lang="en-US"/>
               <a:t>Click to edit Master title style</a:t>
             </a:r>
             <a:endParaRPr/>
@@ -1136,35 +1132,35 @@
           <a:p>
             <a:pPr lvl="0"/>
             <a:r>
-              <a:rPr lang="en-US" smtClean="0"/>
+              <a:rPr lang="en-US"/>
               <a:t>Click to edit Master text styles</a:t>
             </a:r>
           </a:p>
           <a:p>
             <a:pPr lvl="1"/>
             <a:r>
-              <a:rPr lang="en-US" smtClean="0"/>
+              <a:rPr lang="en-US"/>
               <a:t>Second level</a:t>
             </a:r>
           </a:p>
           <a:p>
             <a:pPr lvl="2"/>
             <a:r>
-              <a:rPr lang="en-US" smtClean="0"/>
+              <a:rPr lang="en-US"/>
               <a:t>Third level</a:t>
             </a:r>
           </a:p>
           <a:p>
             <a:pPr lvl="3"/>
             <a:r>
-              <a:rPr lang="en-US" smtClean="0"/>
+              <a:rPr lang="en-US"/>
               <a:t>Fourth level</a:t>
             </a:r>
           </a:p>
           <a:p>
             <a:pPr lvl="4"/>
             <a:r>
-              <a:rPr lang="en-US" smtClean="0"/>
+              <a:rPr lang="en-US"/>
               <a:t>Fifth level</a:t>
             </a:r>
             <a:endParaRPr/>
@@ -1241,20 +1237,20 @@
     </p:spTree>
     <p:extLst>
       <p:ext uri="{BB962C8B-B14F-4D97-AF65-F5344CB8AC3E}">
-        <p14:creationId xmlns:p14="http://schemas.microsoft.com/office/powerpoint/2010/main" xmlns="" val="4079035419"/>
+        <p14:creationId xmlns:p14="http://schemas.microsoft.com/office/powerpoint/2010/main" val="4079035419"/>
       </p:ext>
     </p:extLst>
   </p:cSld>
   <p:clrMapOvr>
     <a:masterClrMapping/>
   </p:clrMapOvr>
-  <mc:AlternateContent xmlns:mc="http://schemas.openxmlformats.org/markup-compatibility/2006">
-    <mc:Choice xmlns:p14="http://schemas.microsoft.com/office/powerpoint/2010/main" xmlns="" Requires="p14">
+  <mc:AlternateContent xmlns:mc="http://schemas.openxmlformats.org/markup-compatibility/2006" xmlns:p14="http://schemas.microsoft.com/office/powerpoint/2010/main">
+    <mc:Choice Requires="p14">
       <p:transition spd="med" p14:dur="700">
         <p:fade/>
       </p:transition>
     </mc:Choice>
-    <mc:Fallback>
+    <mc:Fallback xmlns="">
       <p:transition spd="med">
         <p:fade/>
       </p:transition>
@@ -1296,7 +1292,7 @@
           <a:lstStyle/>
           <a:p>
             <a:r>
-              <a:rPr lang="en-US" smtClean="0"/>
+              <a:rPr lang="en-US"/>
               <a:t>Click to edit Master title style</a:t>
             </a:r>
             <a:endParaRPr/>
@@ -1327,35 +1323,35 @@
           <a:p>
             <a:pPr lvl="0"/>
             <a:r>
-              <a:rPr lang="en-US" smtClean="0"/>
+              <a:rPr lang="en-US"/>
               <a:t>Click to edit Master text styles</a:t>
             </a:r>
           </a:p>
           <a:p>
             <a:pPr lvl="1"/>
             <a:r>
-              <a:rPr lang="en-US" smtClean="0"/>
+              <a:rPr lang="en-US"/>
               <a:t>Second level</a:t>
             </a:r>
           </a:p>
           <a:p>
             <a:pPr lvl="2"/>
             <a:r>
-              <a:rPr lang="en-US" smtClean="0"/>
+              <a:rPr lang="en-US"/>
               <a:t>Third level</a:t>
             </a:r>
           </a:p>
           <a:p>
             <a:pPr lvl="3"/>
             <a:r>
-              <a:rPr lang="en-US" smtClean="0"/>
+              <a:rPr lang="en-US"/>
               <a:t>Fourth level</a:t>
             </a:r>
           </a:p>
           <a:p>
             <a:pPr lvl="4"/>
             <a:r>
-              <a:rPr lang="en-US" smtClean="0"/>
+              <a:rPr lang="en-US"/>
               <a:t>Fifth level</a:t>
             </a:r>
             <a:endParaRPr/>
@@ -1432,20 +1428,20 @@
     </p:spTree>
     <p:extLst>
       <p:ext uri="{BB962C8B-B14F-4D97-AF65-F5344CB8AC3E}">
-        <p14:creationId xmlns:p14="http://schemas.microsoft.com/office/powerpoint/2010/main" xmlns="" val="2738254095"/>
+        <p14:creationId xmlns:p14="http://schemas.microsoft.com/office/powerpoint/2010/main" val="2738254095"/>
       </p:ext>
     </p:extLst>
   </p:cSld>
   <p:clrMapOvr>
     <a:masterClrMapping/>
   </p:clrMapOvr>
-  <mc:AlternateContent xmlns:mc="http://schemas.openxmlformats.org/markup-compatibility/2006">
-    <mc:Choice xmlns:p14="http://schemas.microsoft.com/office/powerpoint/2010/main" xmlns="" Requires="p14">
+  <mc:AlternateContent xmlns:mc="http://schemas.openxmlformats.org/markup-compatibility/2006" xmlns:p14="http://schemas.microsoft.com/office/powerpoint/2010/main">
+    <mc:Choice Requires="p14">
       <p:transition spd="med" p14:dur="700">
         <p:fade/>
       </p:transition>
     </mc:Choice>
-    <mc:Fallback>
+    <mc:Fallback xmlns="">
       <p:transition spd="med">
         <p:fade/>
       </p:transition>
@@ -1515,7 +1511,7 @@
           </a:lstStyle>
           <a:p>
             <a:r>
-              <a:rPr lang="en-US" smtClean="0"/>
+              <a:rPr lang="en-US"/>
               <a:t>Click to edit Master title style</a:t>
             </a:r>
             <a:endParaRPr/>
@@ -1638,7 +1634,7 @@
           <a:p>
             <a:pPr lvl="0"/>
             <a:r>
-              <a:rPr lang="en-US" smtClean="0"/>
+              <a:rPr lang="en-US"/>
               <a:t>Click to edit Master text styles</a:t>
             </a:r>
           </a:p>
@@ -1714,20 +1710,20 @@
     </p:spTree>
     <p:extLst>
       <p:ext uri="{BB962C8B-B14F-4D97-AF65-F5344CB8AC3E}">
-        <p14:creationId xmlns:p14="http://schemas.microsoft.com/office/powerpoint/2010/main" xmlns="" val="1761813311"/>
+        <p14:creationId xmlns:p14="http://schemas.microsoft.com/office/powerpoint/2010/main" val="1761813311"/>
       </p:ext>
     </p:extLst>
   </p:cSld>
   <p:clrMapOvr>
     <a:masterClrMapping/>
   </p:clrMapOvr>
-  <mc:AlternateContent xmlns:mc="http://schemas.openxmlformats.org/markup-compatibility/2006">
-    <mc:Choice xmlns:p14="http://schemas.microsoft.com/office/powerpoint/2010/main" xmlns="" Requires="p14">
+  <mc:AlternateContent xmlns:mc="http://schemas.openxmlformats.org/markup-compatibility/2006" xmlns:p14="http://schemas.microsoft.com/office/powerpoint/2010/main">
+    <mc:Choice Requires="p14">
       <p:transition spd="med" p14:dur="700">
         <p:fade/>
       </p:transition>
     </mc:Choice>
-    <mc:Fallback>
+    <mc:Fallback xmlns="">
       <p:transition spd="med">
         <p:fade/>
       </p:transition>
@@ -1769,7 +1765,7 @@
           <a:lstStyle/>
           <a:p>
             <a:r>
-              <a:rPr lang="en-US" smtClean="0"/>
+              <a:rPr lang="en-US"/>
               <a:t>Click to edit Master title style</a:t>
             </a:r>
             <a:endParaRPr/>
@@ -1828,35 +1824,35 @@
           <a:p>
             <a:pPr lvl="0"/>
             <a:r>
-              <a:rPr lang="en-US" smtClean="0"/>
+              <a:rPr lang="en-US"/>
               <a:t>Click to edit Master text styles</a:t>
             </a:r>
           </a:p>
           <a:p>
             <a:pPr lvl="1"/>
             <a:r>
-              <a:rPr lang="en-US" smtClean="0"/>
+              <a:rPr lang="en-US"/>
               <a:t>Second level</a:t>
             </a:r>
           </a:p>
           <a:p>
             <a:pPr lvl="2"/>
             <a:r>
-              <a:rPr lang="en-US" smtClean="0"/>
+              <a:rPr lang="en-US"/>
               <a:t>Third level</a:t>
             </a:r>
           </a:p>
           <a:p>
             <a:pPr lvl="3"/>
             <a:r>
-              <a:rPr lang="en-US" smtClean="0"/>
+              <a:rPr lang="en-US"/>
               <a:t>Fourth level</a:t>
             </a:r>
           </a:p>
           <a:p>
             <a:pPr lvl="4"/>
             <a:r>
-              <a:rPr lang="en-US" smtClean="0"/>
+              <a:rPr lang="en-US"/>
               <a:t>Fifth level</a:t>
             </a:r>
             <a:endParaRPr/>
@@ -1915,35 +1911,35 @@
           <a:p>
             <a:pPr lvl="0"/>
             <a:r>
-              <a:rPr lang="en-US" smtClean="0"/>
+              <a:rPr lang="en-US"/>
               <a:t>Click to edit Master text styles</a:t>
             </a:r>
           </a:p>
           <a:p>
             <a:pPr lvl="1"/>
             <a:r>
-              <a:rPr lang="en-US" smtClean="0"/>
+              <a:rPr lang="en-US"/>
               <a:t>Second level</a:t>
             </a:r>
           </a:p>
           <a:p>
             <a:pPr lvl="2"/>
             <a:r>
-              <a:rPr lang="en-US" smtClean="0"/>
+              <a:rPr lang="en-US"/>
               <a:t>Third level</a:t>
             </a:r>
           </a:p>
           <a:p>
             <a:pPr lvl="3"/>
             <a:r>
-              <a:rPr lang="en-US" smtClean="0"/>
+              <a:rPr lang="en-US"/>
               <a:t>Fourth level</a:t>
             </a:r>
           </a:p>
           <a:p>
             <a:pPr lvl="4"/>
             <a:r>
-              <a:rPr lang="en-US" smtClean="0"/>
+              <a:rPr lang="en-US"/>
               <a:t>Fifth level</a:t>
             </a:r>
             <a:endParaRPr/>
@@ -2020,20 +2016,20 @@
     </p:spTree>
     <p:extLst>
       <p:ext uri="{BB962C8B-B14F-4D97-AF65-F5344CB8AC3E}">
-        <p14:creationId xmlns:p14="http://schemas.microsoft.com/office/powerpoint/2010/main" xmlns="" val="2825340762"/>
+        <p14:creationId xmlns:p14="http://schemas.microsoft.com/office/powerpoint/2010/main" val="2825340762"/>
       </p:ext>
     </p:extLst>
   </p:cSld>
   <p:clrMapOvr>
     <a:masterClrMapping/>
   </p:clrMapOvr>
-  <mc:AlternateContent xmlns:mc="http://schemas.openxmlformats.org/markup-compatibility/2006">
-    <mc:Choice xmlns:p14="http://schemas.microsoft.com/office/powerpoint/2010/main" xmlns="" Requires="p14">
+  <mc:AlternateContent xmlns:mc="http://schemas.openxmlformats.org/markup-compatibility/2006" xmlns:p14="http://schemas.microsoft.com/office/powerpoint/2010/main">
+    <mc:Choice Requires="p14">
       <p:transition spd="med" p14:dur="700">
         <p:fade/>
       </p:transition>
     </mc:Choice>
-    <mc:Fallback>
+    <mc:Fallback xmlns="">
       <p:transition spd="med">
         <p:fade/>
       </p:transition>
@@ -2079,7 +2075,7 @@
           </a:lstStyle>
           <a:p>
             <a:r>
-              <a:rPr lang="en-US" smtClean="0"/>
+              <a:rPr lang="en-US"/>
               <a:t>Click to edit Master title style</a:t>
             </a:r>
             <a:endParaRPr/>
@@ -2154,7 +2150,7 @@
           <a:p>
             <a:pPr lvl="0"/>
             <a:r>
-              <a:rPr lang="en-US" smtClean="0"/>
+              <a:rPr lang="en-US"/>
               <a:t>Click to edit Master text styles</a:t>
             </a:r>
           </a:p>
@@ -2212,35 +2208,35 @@
           <a:p>
             <a:pPr lvl="0"/>
             <a:r>
-              <a:rPr lang="en-US" smtClean="0"/>
+              <a:rPr lang="en-US"/>
               <a:t>Click to edit Master text styles</a:t>
             </a:r>
           </a:p>
           <a:p>
             <a:pPr lvl="1"/>
             <a:r>
-              <a:rPr lang="en-US" smtClean="0"/>
+              <a:rPr lang="en-US"/>
               <a:t>Second level</a:t>
             </a:r>
           </a:p>
           <a:p>
             <a:pPr lvl="2"/>
             <a:r>
-              <a:rPr lang="en-US" smtClean="0"/>
+              <a:rPr lang="en-US"/>
               <a:t>Third level</a:t>
             </a:r>
           </a:p>
           <a:p>
             <a:pPr lvl="3"/>
             <a:r>
-              <a:rPr lang="en-US" smtClean="0"/>
+              <a:rPr lang="en-US"/>
               <a:t>Fourth level</a:t>
             </a:r>
           </a:p>
           <a:p>
             <a:pPr lvl="4"/>
             <a:r>
-              <a:rPr lang="en-US" smtClean="0"/>
+              <a:rPr lang="en-US"/>
               <a:t>Fifth level</a:t>
             </a:r>
             <a:endParaRPr/>
@@ -2315,7 +2311,7 @@
           <a:p>
             <a:pPr lvl="0"/>
             <a:r>
-              <a:rPr lang="en-US" smtClean="0"/>
+              <a:rPr lang="en-US"/>
               <a:t>Click to edit Master text styles</a:t>
             </a:r>
           </a:p>
@@ -2373,35 +2369,35 @@
           <a:p>
             <a:pPr lvl="0"/>
             <a:r>
-              <a:rPr lang="en-US" smtClean="0"/>
+              <a:rPr lang="en-US"/>
               <a:t>Click to edit Master text styles</a:t>
             </a:r>
           </a:p>
           <a:p>
             <a:pPr lvl="1"/>
             <a:r>
-              <a:rPr lang="en-US" smtClean="0"/>
+              <a:rPr lang="en-US"/>
               <a:t>Second level</a:t>
             </a:r>
           </a:p>
           <a:p>
             <a:pPr lvl="2"/>
             <a:r>
-              <a:rPr lang="en-US" smtClean="0"/>
+              <a:rPr lang="en-US"/>
               <a:t>Third level</a:t>
             </a:r>
           </a:p>
           <a:p>
             <a:pPr lvl="3"/>
             <a:r>
-              <a:rPr lang="en-US" smtClean="0"/>
+              <a:rPr lang="en-US"/>
               <a:t>Fourth level</a:t>
             </a:r>
           </a:p>
           <a:p>
             <a:pPr lvl="4"/>
             <a:r>
-              <a:rPr lang="en-US" smtClean="0"/>
+              <a:rPr lang="en-US"/>
               <a:t>Fifth level</a:t>
             </a:r>
             <a:endParaRPr/>
@@ -2478,20 +2474,20 @@
     </p:spTree>
     <p:extLst>
       <p:ext uri="{BB962C8B-B14F-4D97-AF65-F5344CB8AC3E}">
-        <p14:creationId xmlns:p14="http://schemas.microsoft.com/office/powerpoint/2010/main" xmlns="" val="4208419506"/>
+        <p14:creationId xmlns:p14="http://schemas.microsoft.com/office/powerpoint/2010/main" val="4208419506"/>
       </p:ext>
     </p:extLst>
   </p:cSld>
   <p:clrMapOvr>
     <a:masterClrMapping/>
   </p:clrMapOvr>
-  <mc:AlternateContent xmlns:mc="http://schemas.openxmlformats.org/markup-compatibility/2006">
-    <mc:Choice xmlns:p14="http://schemas.microsoft.com/office/powerpoint/2010/main" xmlns="" Requires="p14">
+  <mc:AlternateContent xmlns:mc="http://schemas.openxmlformats.org/markup-compatibility/2006" xmlns:p14="http://schemas.microsoft.com/office/powerpoint/2010/main">
+    <mc:Choice Requires="p14">
       <p:transition spd="med" p14:dur="700">
         <p:fade/>
       </p:transition>
     </mc:Choice>
-    <mc:Fallback>
+    <mc:Fallback xmlns="">
       <p:transition spd="med">
         <p:fade/>
       </p:transition>
@@ -2533,7 +2529,7 @@
           <a:lstStyle/>
           <a:p>
             <a:r>
-              <a:rPr lang="en-US" smtClean="0"/>
+              <a:rPr lang="en-US"/>
               <a:t>Click to edit Master title style</a:t>
             </a:r>
             <a:endParaRPr/>
@@ -2610,20 +2606,20 @@
     </p:spTree>
     <p:extLst>
       <p:ext uri="{BB962C8B-B14F-4D97-AF65-F5344CB8AC3E}">
-        <p14:creationId xmlns:p14="http://schemas.microsoft.com/office/powerpoint/2010/main" xmlns="" val="1626631400"/>
+        <p14:creationId xmlns:p14="http://schemas.microsoft.com/office/powerpoint/2010/main" val="1626631400"/>
       </p:ext>
     </p:extLst>
   </p:cSld>
   <p:clrMapOvr>
     <a:masterClrMapping/>
   </p:clrMapOvr>
-  <mc:AlternateContent xmlns:mc="http://schemas.openxmlformats.org/markup-compatibility/2006">
-    <mc:Choice xmlns:p14="http://schemas.microsoft.com/office/powerpoint/2010/main" xmlns="" Requires="p14">
+  <mc:AlternateContent xmlns:mc="http://schemas.openxmlformats.org/markup-compatibility/2006" xmlns:p14="http://schemas.microsoft.com/office/powerpoint/2010/main">
+    <mc:Choice Requires="p14">
       <p:transition spd="med" p14:dur="700">
         <p:fade/>
       </p:transition>
     </mc:Choice>
-    <mc:Fallback>
+    <mc:Fallback xmlns="">
       <p:transition spd="med">
         <p:fade/>
       </p:transition>
@@ -2727,20 +2723,20 @@
     </p:spTree>
     <p:extLst>
       <p:ext uri="{BB962C8B-B14F-4D97-AF65-F5344CB8AC3E}">
-        <p14:creationId xmlns:p14="http://schemas.microsoft.com/office/powerpoint/2010/main" xmlns="" val="3607540120"/>
+        <p14:creationId xmlns:p14="http://schemas.microsoft.com/office/powerpoint/2010/main" val="3607540120"/>
       </p:ext>
     </p:extLst>
   </p:cSld>
   <p:clrMapOvr>
     <a:masterClrMapping/>
   </p:clrMapOvr>
-  <mc:AlternateContent xmlns:mc="http://schemas.openxmlformats.org/markup-compatibility/2006">
-    <mc:Choice xmlns:p14="http://schemas.microsoft.com/office/powerpoint/2010/main" xmlns="" Requires="p14">
+  <mc:AlternateContent xmlns:mc="http://schemas.openxmlformats.org/markup-compatibility/2006" xmlns:p14="http://schemas.microsoft.com/office/powerpoint/2010/main">
+    <mc:Choice Requires="p14">
       <p:transition spd="med" p14:dur="700">
         <p:fade/>
       </p:transition>
     </mc:Choice>
-    <mc:Fallback>
+    <mc:Fallback xmlns="">
       <p:transition spd="med">
         <p:fade/>
       </p:transition>
@@ -2814,7 +2810,7 @@
           </a:lstStyle>
           <a:p>
             <a:r>
-              <a:rPr lang="en-US" smtClean="0"/>
+              <a:rPr lang="en-US"/>
               <a:t>Click to edit Master title style</a:t>
             </a:r>
             <a:endParaRPr/>
@@ -2888,7 +2884,7 @@
           <a:p>
             <a:pPr lvl="0"/>
             <a:r>
-              <a:rPr lang="en-US" smtClean="0"/>
+              <a:rPr lang="en-US"/>
               <a:t>Click to edit Master text styles</a:t>
             </a:r>
           </a:p>
@@ -2946,35 +2942,35 @@
           <a:p>
             <a:pPr lvl="0"/>
             <a:r>
-              <a:rPr lang="en-US" smtClean="0"/>
+              <a:rPr lang="en-US"/>
               <a:t>Click to edit Master text styles</a:t>
             </a:r>
           </a:p>
           <a:p>
             <a:pPr lvl="1"/>
             <a:r>
-              <a:rPr lang="en-US" smtClean="0"/>
+              <a:rPr lang="en-US"/>
               <a:t>Second level</a:t>
             </a:r>
           </a:p>
           <a:p>
             <a:pPr lvl="2"/>
             <a:r>
-              <a:rPr lang="en-US" smtClean="0"/>
+              <a:rPr lang="en-US"/>
               <a:t>Third level</a:t>
             </a:r>
           </a:p>
           <a:p>
             <a:pPr lvl="3"/>
             <a:r>
-              <a:rPr lang="en-US" smtClean="0"/>
+              <a:rPr lang="en-US"/>
               <a:t>Fourth level</a:t>
             </a:r>
           </a:p>
           <a:p>
             <a:pPr lvl="4"/>
             <a:r>
-              <a:rPr lang="en-US" smtClean="0"/>
+              <a:rPr lang="en-US"/>
               <a:t>Fifth level</a:t>
             </a:r>
             <a:endParaRPr/>
@@ -3051,20 +3047,20 @@
     </p:spTree>
     <p:extLst>
       <p:ext uri="{BB962C8B-B14F-4D97-AF65-F5344CB8AC3E}">
-        <p14:creationId xmlns:p14="http://schemas.microsoft.com/office/powerpoint/2010/main" xmlns="" val="2544981540"/>
+        <p14:creationId xmlns:p14="http://schemas.microsoft.com/office/powerpoint/2010/main" val="2544981540"/>
       </p:ext>
     </p:extLst>
   </p:cSld>
   <p:clrMapOvr>
     <a:masterClrMapping/>
   </p:clrMapOvr>
-  <mc:AlternateContent xmlns:mc="http://schemas.openxmlformats.org/markup-compatibility/2006">
-    <mc:Choice xmlns:p14="http://schemas.microsoft.com/office/powerpoint/2010/main" xmlns="" Requires="p14">
+  <mc:AlternateContent xmlns:mc="http://schemas.openxmlformats.org/markup-compatibility/2006" xmlns:p14="http://schemas.microsoft.com/office/powerpoint/2010/main">
+    <mc:Choice Requires="p14">
       <p:transition spd="med" p14:dur="700">
         <p:fade/>
       </p:transition>
     </mc:Choice>
-    <mc:Fallback>
+    <mc:Fallback xmlns="">
       <p:transition spd="med">
         <p:fade/>
       </p:transition>
@@ -3138,7 +3134,7 @@
           </a:lstStyle>
           <a:p>
             <a:r>
-              <a:rPr lang="en-US" smtClean="0"/>
+              <a:rPr lang="en-US"/>
               <a:t>Click to edit Master title style</a:t>
             </a:r>
             <a:endParaRPr/>
@@ -3212,7 +3208,7 @@
           <a:p>
             <a:pPr lvl="0"/>
             <a:r>
-              <a:rPr lang="en-US" smtClean="0"/>
+              <a:rPr lang="en-US"/>
               <a:t>Click to edit Master text styles</a:t>
             </a:r>
           </a:p>
@@ -3287,7 +3283,7 @@
           </a:lstStyle>
           <a:p>
             <a:r>
-              <a:rPr lang="en-US" smtClean="0"/>
+              <a:rPr lang="en-US"/>
               <a:t>Click icon to add picture</a:t>
             </a:r>
             <a:endParaRPr/>
@@ -3364,20 +3360,20 @@
     </p:spTree>
     <p:extLst>
       <p:ext uri="{BB962C8B-B14F-4D97-AF65-F5344CB8AC3E}">
-        <p14:creationId xmlns:p14="http://schemas.microsoft.com/office/powerpoint/2010/main" xmlns="" val="2249172152"/>
+        <p14:creationId xmlns:p14="http://schemas.microsoft.com/office/powerpoint/2010/main" val="2249172152"/>
       </p:ext>
     </p:extLst>
   </p:cSld>
   <p:clrMapOvr>
     <a:masterClrMapping/>
   </p:clrMapOvr>
-  <mc:AlternateContent xmlns:mc="http://schemas.openxmlformats.org/markup-compatibility/2006">
-    <mc:Choice xmlns:p14="http://schemas.microsoft.com/office/powerpoint/2010/main" xmlns="" Requires="p14">
+  <mc:AlternateContent xmlns:mc="http://schemas.openxmlformats.org/markup-compatibility/2006" xmlns:p14="http://schemas.microsoft.com/office/powerpoint/2010/main">
+    <mc:Choice Requires="p14">
       <p:transition spd="med" p14:dur="700">
         <p:fade/>
       </p:transition>
     </mc:Choice>
-    <mc:Fallback>
+    <mc:Fallback xmlns="">
       <p:transition spd="med">
         <p:fade/>
       </p:transition>
@@ -3443,7 +3439,7 @@
           <a:lstStyle/>
           <a:p>
             <a:r>
-              <a:rPr lang="en-US" smtClean="0"/>
+              <a:rPr lang="en-US"/>
               <a:t>Click to edit Master title style</a:t>
             </a:r>
             <a:endParaRPr/>
@@ -3477,35 +3473,35 @@
           <a:p>
             <a:pPr lvl="0"/>
             <a:r>
-              <a:rPr lang="en-US" smtClean="0"/>
+              <a:rPr lang="en-US"/>
               <a:t>Click to edit Master text styles</a:t>
             </a:r>
           </a:p>
           <a:p>
             <a:pPr lvl="1"/>
             <a:r>
-              <a:rPr lang="en-US" smtClean="0"/>
+              <a:rPr lang="en-US"/>
               <a:t>Second level</a:t>
             </a:r>
           </a:p>
           <a:p>
             <a:pPr lvl="2"/>
             <a:r>
-              <a:rPr lang="en-US" smtClean="0"/>
+              <a:rPr lang="en-US"/>
               <a:t>Third level</a:t>
             </a:r>
           </a:p>
           <a:p>
             <a:pPr lvl="3"/>
             <a:r>
-              <a:rPr lang="en-US" smtClean="0"/>
+              <a:rPr lang="en-US"/>
               <a:t>Fourth level</a:t>
             </a:r>
           </a:p>
           <a:p>
             <a:pPr lvl="4"/>
             <a:r>
-              <a:rPr lang="en-US" smtClean="0"/>
+              <a:rPr lang="en-US"/>
               <a:t>Fifth level</a:t>
             </a:r>
             <a:endParaRPr dirty="0"/>
@@ -3636,7 +3632,7 @@
     </p:spTree>
     <p:extLst>
       <p:ext uri="{BB962C8B-B14F-4D97-AF65-F5344CB8AC3E}">
-        <p14:creationId xmlns:p14="http://schemas.microsoft.com/office/powerpoint/2010/main" xmlns="" val="1403059996"/>
+        <p14:creationId xmlns:p14="http://schemas.microsoft.com/office/powerpoint/2010/main" val="1403059996"/>
       </p:ext>
     </p:extLst>
   </p:cSld>
@@ -3654,13 +3650,13 @@
     <p:sldLayoutId id="2147483658" r:id="rId10"/>
     <p:sldLayoutId id="2147483659" r:id="rId11"/>
   </p:sldLayoutIdLst>
-  <mc:AlternateContent xmlns:mc="http://schemas.openxmlformats.org/markup-compatibility/2006">
-    <mc:Choice xmlns:p14="http://schemas.microsoft.com/office/powerpoint/2010/main" xmlns="" Requires="p14">
+  <mc:AlternateContent xmlns:mc="http://schemas.openxmlformats.org/markup-compatibility/2006" xmlns:p14="http://schemas.microsoft.com/office/powerpoint/2010/main">
+    <mc:Choice Requires="p14">
       <p:transition spd="med" p14:dur="700">
         <p:fade/>
       </p:transition>
     </mc:Choice>
-    <mc:Fallback>
+    <mc:Fallback xmlns="">
       <p:transition spd="med">
         <p:fade/>
       </p:transition>
@@ -3968,7 +3964,7 @@
   </p:txStyles>
   <p:extLst mod="1">
     <p:ext uri="{27BBF7A9-308A-43DC-89C8-2F10F3537804}">
-      <p15:sldGuideLst xmlns:p15="http://schemas.microsoft.com/office/powerpoint/2012/main" xmlns="">
+      <p15:sldGuideLst xmlns:p15="http://schemas.microsoft.com/office/powerpoint/2012/main">
         <p15:guide id="1" pos="3839" userDrawn="1">
           <p15:clr>
             <a:srgbClr val="F26B43"/>
@@ -4018,7 +4014,7 @@
           <a:lstStyle/>
           <a:p>
             <a:r>
-              <a:rPr lang="en-US" dirty="0" err="1" smtClean="0"/>
+              <a:rPr lang="en-US" dirty="0" err="1"/>
               <a:t>ReLocate</a:t>
             </a:r>
             <a:endParaRPr lang="en-US" dirty="0"/>
@@ -4041,46 +4037,29 @@
           <a:lstStyle/>
           <a:p>
             <a:r>
-              <a:rPr lang="it-IT" dirty="0" smtClean="0"/>
-              <a:t>by: </a:t>
-            </a:r>
-            <a:r>
-              <a:rPr lang="it-IT" dirty="0" smtClean="0"/>
-              <a:t>jenny, madeeha, </a:t>
-            </a:r>
-            <a:r>
-              <a:rPr lang="it-IT" dirty="0" smtClean="0"/>
-              <a:t>Patrick, tasnim</a:t>
-            </a:r>
-            <a:r>
-              <a:rPr lang="it-IT" dirty="0" smtClean="0"/>
-              <a:t> &amp;</a:t>
-            </a:r>
-            <a:r>
-              <a:rPr lang="it-IT" dirty="0" smtClean="0"/>
-              <a:t> umme salma</a:t>
-            </a:r>
-            <a:endParaRPr lang="it-IT" dirty="0"/>
+              <a:rPr lang="it-IT" dirty="0"/>
+              <a:t>by: jenny, madeeha, Patrick, tasnim &amp; umme salma</a:t>
+            </a:r>
           </a:p>
         </p:txBody>
       </p:sp>
     </p:spTree>
     <p:extLst>
       <p:ext uri="{BB962C8B-B14F-4D97-AF65-F5344CB8AC3E}">
-        <p14:creationId xmlns:p14="http://schemas.microsoft.com/office/powerpoint/2010/main" xmlns="" val="2808920126"/>
+        <p14:creationId xmlns:p14="http://schemas.microsoft.com/office/powerpoint/2010/main" val="2808920126"/>
       </p:ext>
     </p:extLst>
   </p:cSld>
   <p:clrMapOvr>
     <a:masterClrMapping/>
   </p:clrMapOvr>
-  <mc:AlternateContent xmlns:mc="http://schemas.openxmlformats.org/markup-compatibility/2006">
-    <mc:Choice xmlns:p14="http://schemas.microsoft.com/office/powerpoint/2010/main" xmlns="" Requires="p14">
+  <mc:AlternateContent xmlns:mc="http://schemas.openxmlformats.org/markup-compatibility/2006" xmlns:p14="http://schemas.microsoft.com/office/powerpoint/2010/main">
+    <mc:Choice Requires="p14">
       <p:transition spd="med" p14:dur="700">
         <p:fade/>
       </p:transition>
     </mc:Choice>
-    <mc:Fallback>
+    <mc:Fallback xmlns="">
       <p:transition spd="med">
         <p:fade/>
       </p:transition>
@@ -4123,10 +4102,9 @@
           <a:p>
             <a:pPr algn="r"/>
             <a:r>
-              <a:rPr lang="en-US" dirty="0" smtClean="0"/>
+              <a:rPr lang="en-US" dirty="0"/>
               <a:t>Graph Algorithm</a:t>
             </a:r>
-            <a:endParaRPr lang="en-US" dirty="0"/>
           </a:p>
         </p:txBody>
       </p:sp>
@@ -4159,32 +4137,25 @@
     </p:spTree>
     <p:extLst>
       <p:ext uri="{BB962C8B-B14F-4D97-AF65-F5344CB8AC3E}">
-        <p14:creationId xmlns:p14="http://schemas.microsoft.com/office/powerpoint/2010/main" xmlns="" val="4206988261"/>
+        <p14:creationId xmlns:p14="http://schemas.microsoft.com/office/powerpoint/2010/main" val="4206988261"/>
       </p:ext>
     </p:extLst>
   </p:cSld>
   <p:clrMapOvr>
     <a:masterClrMapping/>
   </p:clrMapOvr>
-  <mc:AlternateContent xmlns:mc="http://schemas.openxmlformats.org/markup-compatibility/2006">
-    <mc:Choice xmlns:p14="http://schemas.microsoft.com/office/powerpoint/2010/main" xmlns="" Requires="p14">
+  <mc:AlternateContent xmlns:mc="http://schemas.openxmlformats.org/markup-compatibility/2006" xmlns:p14="http://schemas.microsoft.com/office/powerpoint/2010/main">
+    <mc:Choice Requires="p14">
       <p:transition spd="med" p14:dur="700">
         <p:fade/>
       </p:transition>
     </mc:Choice>
-    <mc:Fallback>
+    <mc:Fallback xmlns="">
       <p:transition spd="med">
         <p:fade/>
       </p:transition>
     </mc:Fallback>
   </mc:AlternateContent>
-  <p:timing>
-    <p:tnLst>
-      <p:par>
-        <p:cTn id="1" dur="indefinite" restart="never" nodeType="tmRoot"/>
-      </p:par>
-    </p:tnLst>
-  </p:timing>
 </p:sld>
 </file>
 
@@ -4222,10 +4193,9 @@
           <a:p>
             <a:pPr algn="r"/>
             <a:r>
-              <a:rPr lang="en-US" dirty="0" smtClean="0"/>
+              <a:rPr lang="en-US" dirty="0"/>
               <a:t>Graph Algorithm</a:t>
             </a:r>
-            <a:endParaRPr lang="en-US" dirty="0"/>
           </a:p>
         </p:txBody>
       </p:sp>
@@ -4253,35 +4223,35 @@
           <a:p>
             <a:pPr algn="just"/>
             <a:r>
-              <a:rPr lang="en-CA" dirty="0" smtClean="0"/>
+              <a:rPr lang="en-CA" dirty="0"/>
               <a:t>Search accepts a City object</a:t>
             </a:r>
           </a:p>
           <a:p>
             <a:pPr algn="just"/>
             <a:r>
-              <a:rPr lang="en-CA" dirty="0" smtClean="0"/>
+              <a:rPr lang="en-CA" dirty="0"/>
               <a:t>Graph looks for the dummy vertex associated with the city’s outlook</a:t>
             </a:r>
           </a:p>
           <a:p>
             <a:pPr algn="just"/>
             <a:r>
-              <a:rPr lang="en-CA" dirty="0" smtClean="0"/>
+              <a:rPr lang="en-CA" dirty="0"/>
               <a:t>Dummy node is found by following designated dummy edges</a:t>
             </a:r>
           </a:p>
           <a:p>
             <a:pPr algn="just"/>
             <a:r>
-              <a:rPr lang="en-CA" dirty="0" smtClean="0"/>
+              <a:rPr lang="en-CA" dirty="0"/>
               <a:t>All edges leading out of this node are sorted by weight</a:t>
             </a:r>
           </a:p>
           <a:p>
             <a:pPr algn="just"/>
             <a:r>
-              <a:rPr lang="en-CA" dirty="0" smtClean="0"/>
+              <a:rPr lang="en-CA" dirty="0"/>
               <a:t>Takes the top edges from this node, trace them back to the vertex, and return the City’s string representation</a:t>
             </a:r>
           </a:p>
@@ -4290,32 +4260,25 @@
     </p:spTree>
     <p:extLst>
       <p:ext uri="{BB962C8B-B14F-4D97-AF65-F5344CB8AC3E}">
-        <p14:creationId xmlns:p14="http://schemas.microsoft.com/office/powerpoint/2010/main" xmlns="" val="4206988261"/>
+        <p14:creationId xmlns:p14="http://schemas.microsoft.com/office/powerpoint/2010/main" val="4206988261"/>
       </p:ext>
     </p:extLst>
   </p:cSld>
   <p:clrMapOvr>
     <a:masterClrMapping/>
   </p:clrMapOvr>
-  <mc:AlternateContent xmlns:mc="http://schemas.openxmlformats.org/markup-compatibility/2006">
-    <mc:Choice xmlns:p14="http://schemas.microsoft.com/office/powerpoint/2010/main" xmlns="" Requires="p14">
+  <mc:AlternateContent xmlns:mc="http://schemas.openxmlformats.org/markup-compatibility/2006" xmlns:p14="http://schemas.microsoft.com/office/powerpoint/2010/main">
+    <mc:Choice Requires="p14">
       <p:transition spd="med" p14:dur="700">
         <p:fade/>
       </p:transition>
     </mc:Choice>
-    <mc:Fallback>
+    <mc:Fallback xmlns="">
       <p:transition spd="med">
         <p:fade/>
       </p:transition>
     </mc:Fallback>
   </mc:AlternateContent>
-  <p:timing>
-    <p:tnLst>
-      <p:par>
-        <p:cTn id="1" dur="indefinite" restart="never" nodeType="tmRoot"/>
-      </p:par>
-    </p:tnLst>
-  </p:timing>
 </p:sld>
 </file>
 
@@ -4353,10 +4316,9 @@
           <a:p>
             <a:pPr algn="r"/>
             <a:r>
-              <a:rPr lang="en-US" dirty="0" smtClean="0"/>
+              <a:rPr lang="en-US" dirty="0"/>
               <a:t>Graph Algorithm</a:t>
             </a:r>
-            <a:endParaRPr lang="en-US" dirty="0"/>
           </a:p>
         </p:txBody>
       </p:sp>
@@ -4384,28 +4346,28 @@
           <a:p>
             <a:pPr algn="just"/>
             <a:r>
-              <a:rPr lang="en-CA" dirty="0" smtClean="0"/>
+              <a:rPr lang="en-CA" dirty="0"/>
               <a:t>Dummy nodes have a null reference for their city</a:t>
             </a:r>
           </a:p>
           <a:p>
             <a:pPr algn="just"/>
             <a:r>
-              <a:rPr lang="en-CA" dirty="0" smtClean="0"/>
+              <a:rPr lang="en-CA" dirty="0"/>
               <a:t>Links to dummy nodes have a weight of -1</a:t>
             </a:r>
           </a:p>
           <a:p>
             <a:pPr algn="just"/>
             <a:r>
-              <a:rPr lang="en-CA" dirty="0" smtClean="0"/>
+              <a:rPr lang="en-CA" dirty="0"/>
               <a:t>All dummy nodes are connected to at least one and at most two others</a:t>
             </a:r>
           </a:p>
           <a:p>
             <a:pPr algn="just"/>
             <a:r>
-              <a:rPr lang="en-CA" dirty="0" smtClean="0"/>
+              <a:rPr lang="en-CA" dirty="0"/>
               <a:t>All cities have a single connection leading back to the dummy node</a:t>
             </a:r>
           </a:p>
@@ -4414,32 +4376,25 @@
     </p:spTree>
     <p:extLst>
       <p:ext uri="{BB962C8B-B14F-4D97-AF65-F5344CB8AC3E}">
-        <p14:creationId xmlns:p14="http://schemas.microsoft.com/office/powerpoint/2010/main" xmlns="" val="4206988261"/>
+        <p14:creationId xmlns:p14="http://schemas.microsoft.com/office/powerpoint/2010/main" val="4206988261"/>
       </p:ext>
     </p:extLst>
   </p:cSld>
   <p:clrMapOvr>
     <a:masterClrMapping/>
   </p:clrMapOvr>
-  <mc:AlternateContent xmlns:mc="http://schemas.openxmlformats.org/markup-compatibility/2006">
-    <mc:Choice xmlns:p14="http://schemas.microsoft.com/office/powerpoint/2010/main" xmlns="" Requires="p14">
+  <mc:AlternateContent xmlns:mc="http://schemas.openxmlformats.org/markup-compatibility/2006" xmlns:p14="http://schemas.microsoft.com/office/powerpoint/2010/main">
+    <mc:Choice Requires="p14">
       <p:transition spd="med" p14:dur="700">
         <p:fade/>
       </p:transition>
     </mc:Choice>
-    <mc:Fallback>
+    <mc:Fallback xmlns="">
       <p:transition spd="med">
         <p:fade/>
       </p:transition>
     </mc:Fallback>
   </mc:AlternateContent>
-  <p:timing>
-    <p:tnLst>
-      <p:par>
-        <p:cTn id="1" dur="indefinite" restart="never" nodeType="tmRoot"/>
-      </p:par>
-    </p:tnLst>
-  </p:timing>
 </p:sld>
 </file>
 
@@ -4477,10 +4432,9 @@
           <a:p>
             <a:pPr algn="r"/>
             <a:r>
-              <a:rPr lang="en-CA" dirty="0" smtClean="0"/>
-              <a:t>Scrum – Experiential Learning</a:t>
-            </a:r>
-            <a:endParaRPr lang="en-CA" dirty="0"/>
+              <a:rPr lang="en-CA" dirty="0"/>
+              <a:t>Testing</a:t>
+            </a:r>
           </a:p>
         </p:txBody>
       </p:sp>
@@ -4491,138 +4445,63 @@
             <a:spLocks noGrp="1"/>
           </p:cNvSpPr>
           <p:nvPr>
-            <p:ph idx="1"/>
+            <p:ph sz="half" idx="1"/>
           </p:nvPr>
         </p:nvSpPr>
         <p:spPr/>
         <p:txBody>
-          <a:bodyPr>
-            <a:normAutofit lnSpcReduction="10000"/>
-          </a:bodyPr>
+          <a:bodyPr/>
           <a:lstStyle/>
           <a:p>
             <a:r>
-              <a:rPr lang="en-CA" dirty="0" smtClean="0"/>
-              <a:t>4 sprints – in essence:</a:t>
-            </a:r>
-          </a:p>
-          <a:p>
-            <a:pPr lvl="2">
-              <a:buFont typeface="Wingdings" pitchFamily="2" charset="2"/>
-              <a:buChar char="Ø"/>
-            </a:pPr>
-            <a:r>
-              <a:rPr lang="en-CA" dirty="0" smtClean="0"/>
-              <a:t>GUI development and data structure implementation</a:t>
-            </a:r>
-          </a:p>
-          <a:p>
-            <a:pPr lvl="2">
-              <a:buFont typeface="Wingdings" pitchFamily="2" charset="2"/>
-              <a:buChar char="Ø"/>
-            </a:pPr>
-            <a:r>
-              <a:rPr lang="en-CA" dirty="0" smtClean="0"/>
-              <a:t>Sort and search implementation</a:t>
-            </a:r>
-          </a:p>
-          <a:p>
-            <a:pPr lvl="2">
-              <a:buFont typeface="Wingdings" pitchFamily="2" charset="2"/>
-              <a:buChar char="Ø"/>
-            </a:pPr>
-            <a:r>
-              <a:rPr lang="en-CA" dirty="0" smtClean="0"/>
-              <a:t>Graph implementation</a:t>
-            </a:r>
-          </a:p>
-          <a:p>
-            <a:pPr lvl="2">
-              <a:buFont typeface="Wingdings" pitchFamily="2" charset="2"/>
-              <a:buChar char="Ø"/>
-            </a:pPr>
-            <a:r>
-              <a:rPr lang="en-CA" dirty="0" smtClean="0"/>
-              <a:t>Integration and testing</a:t>
-            </a:r>
-          </a:p>
-          <a:p>
-            <a:pPr lvl="1">
-              <a:buFont typeface="Wingdings" pitchFamily="2" charset="2"/>
-              <a:buChar char="Ø"/>
-            </a:pPr>
-            <a:endParaRPr lang="en-CA" dirty="0" smtClean="0"/>
-          </a:p>
-          <a:p>
-            <a:r>
-              <a:rPr lang="en-CA" dirty="0" smtClean="0"/>
-              <a:t>Software development methodology:</a:t>
-            </a:r>
-          </a:p>
-          <a:p>
-            <a:pPr algn="ctr">
-              <a:buNone/>
-            </a:pPr>
-            <a:r>
-              <a:rPr lang="en-CA" dirty="0" smtClean="0"/>
-              <a:t>Waterfall </a:t>
-            </a:r>
-            <a:r>
-              <a:rPr lang="en-CA" dirty="0" smtClean="0">
-                <a:sym typeface="Wingdings" pitchFamily="2" charset="2"/>
-              </a:rPr>
-              <a:t> Scrum</a:t>
-            </a:r>
-          </a:p>
-          <a:p>
-            <a:r>
-              <a:rPr lang="en-CA" dirty="0" smtClean="0">
-                <a:sym typeface="Wingdings" pitchFamily="2" charset="2"/>
-              </a:rPr>
-              <a:t>Version control:</a:t>
-            </a:r>
-          </a:p>
-          <a:p>
-            <a:pPr algn="ctr">
-              <a:buNone/>
-            </a:pPr>
-            <a:r>
-              <a:rPr lang="en-CA" dirty="0" smtClean="0">
-                <a:sym typeface="Wingdings" pitchFamily="2" charset="2"/>
-              </a:rPr>
-              <a:t>Manual maintenance  </a:t>
-            </a:r>
-            <a:r>
-              <a:rPr lang="en-CA" dirty="0" err="1" smtClean="0">
-                <a:sym typeface="Wingdings" pitchFamily="2" charset="2"/>
-              </a:rPr>
-              <a:t>GitLab</a:t>
-            </a:r>
-            <a:r>
-              <a:rPr lang="en-CA" dirty="0" smtClean="0">
-                <a:sym typeface="Wingdings" pitchFamily="2" charset="2"/>
-              </a:rPr>
-              <a:t> repository</a:t>
-            </a:r>
-            <a:endParaRPr lang="en-CA" dirty="0" smtClean="0"/>
-          </a:p>
-          <a:p>
-            <a:endParaRPr lang="en-CA" dirty="0"/>
+              <a:rPr lang="en-CA" dirty="0"/>
+              <a:t>Unit testing</a:t>
+            </a:r>
+          </a:p>
+          <a:p>
+            <a:r>
+              <a:rPr lang="en-CA" dirty="0"/>
+              <a:t>Integration testing</a:t>
+            </a:r>
+          </a:p>
+        </p:txBody>
+      </p:sp>
+      <p:sp>
+        <p:nvSpPr>
+          <p:cNvPr id="4" name="Content Placeholder 3"/>
+          <p:cNvSpPr>
+            <a:spLocks noGrp="1"/>
+          </p:cNvSpPr>
+          <p:nvPr>
+            <p:ph sz="half" idx="2"/>
+          </p:nvPr>
+        </p:nvSpPr>
+        <p:spPr/>
+        <p:txBody>
+          <a:bodyPr/>
+          <a:lstStyle/>
+          <a:p>
+            <a:endParaRPr lang="en-CA"/>
           </a:p>
         </p:txBody>
       </p:sp>
     </p:spTree>
+    <p:extLst>
+      <p:ext uri="{BB962C8B-B14F-4D97-AF65-F5344CB8AC3E}">
+        <p14:creationId xmlns:p14="http://schemas.microsoft.com/office/powerpoint/2010/main" val="411807513"/>
+      </p:ext>
+    </p:extLst>
   </p:cSld>
   <p:clrMapOvr>
     <a:masterClrMapping/>
   </p:clrMapOvr>
-  <mc:AlternateContent xmlns:mc="http://schemas.openxmlformats.org/markup-compatibility/2006">
-    <mc:Choice xmlns:p14="http://schemas.microsoft.com/office/powerpoint/2010/main" xmlns="" Requires="p14">
+  <mc:AlternateContent xmlns:mc="http://schemas.openxmlformats.org/markup-compatibility/2006" xmlns:p14="http://schemas.microsoft.com/office/powerpoint/2010/main">
+    <mc:Choice Requires="p14">
       <p:transition spd="med" p14:dur="700">
         <p:fade/>
       </p:transition>
     </mc:Choice>
-    <mc:Fallback>
+    <mc:Fallback xmlns="">
       <p:transition spd="med">
         <p:fade/>
       </p:transition>
@@ -4665,47 +4544,133 @@
           <a:p>
             <a:pPr algn="r"/>
             <a:r>
-              <a:rPr lang="en-CA" dirty="0" smtClean="0"/>
-              <a:t>Improvements</a:t>
-            </a:r>
+              <a:rPr lang="en-CA" dirty="0"/>
+              <a:t>Scrum – Experiential Learning</a:t>
+            </a:r>
+          </a:p>
+        </p:txBody>
+      </p:sp>
+      <p:sp>
+        <p:nvSpPr>
+          <p:cNvPr id="3" name="Content Placeholder 2"/>
+          <p:cNvSpPr>
+            <a:spLocks noGrp="1"/>
+          </p:cNvSpPr>
+          <p:nvPr>
+            <p:ph idx="1"/>
+          </p:nvPr>
+        </p:nvSpPr>
+        <p:spPr/>
+        <p:txBody>
+          <a:bodyPr>
+            <a:normAutofit lnSpcReduction="10000"/>
+          </a:bodyPr>
+          <a:lstStyle/>
+          <a:p>
+            <a:r>
+              <a:rPr lang="en-CA" dirty="0"/>
+              <a:t>4 sprints – in essence:</a:t>
+            </a:r>
+          </a:p>
+          <a:p>
+            <a:pPr lvl="2">
+              <a:buFont typeface="Wingdings" pitchFamily="2" charset="2"/>
+              <a:buChar char="Ø"/>
+            </a:pPr>
+            <a:r>
+              <a:rPr lang="en-CA" dirty="0"/>
+              <a:t>GUI development and data structure implementation</a:t>
+            </a:r>
+          </a:p>
+          <a:p>
+            <a:pPr lvl="2">
+              <a:buFont typeface="Wingdings" pitchFamily="2" charset="2"/>
+              <a:buChar char="Ø"/>
+            </a:pPr>
+            <a:r>
+              <a:rPr lang="en-CA" dirty="0"/>
+              <a:t>Sort and search implementation</a:t>
+            </a:r>
+          </a:p>
+          <a:p>
+            <a:pPr lvl="2">
+              <a:buFont typeface="Wingdings" pitchFamily="2" charset="2"/>
+              <a:buChar char="Ø"/>
+            </a:pPr>
+            <a:r>
+              <a:rPr lang="en-CA" dirty="0"/>
+              <a:t>Graph implementation</a:t>
+            </a:r>
+          </a:p>
+          <a:p>
+            <a:pPr lvl="2">
+              <a:buFont typeface="Wingdings" pitchFamily="2" charset="2"/>
+              <a:buChar char="Ø"/>
+            </a:pPr>
+            <a:r>
+              <a:rPr lang="en-CA" dirty="0"/>
+              <a:t>Integration and testing</a:t>
+            </a:r>
+          </a:p>
+          <a:p>
+            <a:pPr lvl="1">
+              <a:buFont typeface="Wingdings" pitchFamily="2" charset="2"/>
+              <a:buChar char="Ø"/>
+            </a:pPr>
             <a:endParaRPr lang="en-CA" dirty="0"/>
           </a:p>
-        </p:txBody>
-      </p:sp>
-      <p:sp>
-        <p:nvSpPr>
-          <p:cNvPr id="3" name="Content Placeholder 2"/>
-          <p:cNvSpPr>
-            <a:spLocks noGrp="1"/>
-          </p:cNvSpPr>
-          <p:nvPr>
-            <p:ph idx="1"/>
-          </p:nvPr>
-        </p:nvSpPr>
-        <p:spPr/>
-        <p:txBody>
-          <a:bodyPr/>
-          <a:lstStyle/>
-          <a:p>
-            <a:r>
-              <a:rPr lang="en-CA" dirty="0" smtClean="0"/>
-              <a:t>Scalable</a:t>
-            </a:r>
-          </a:p>
-          <a:p>
-            <a:r>
-              <a:rPr lang="en-CA" dirty="0" smtClean="0"/>
-              <a:t>Better data: more information and outlook parameters</a:t>
-            </a:r>
-          </a:p>
-          <a:p>
-            <a:r>
-              <a:rPr lang="en-CA" dirty="0" smtClean="0"/>
-              <a:t>Online service</a:t>
-            </a:r>
-          </a:p>
-          <a:p>
-            <a:endParaRPr lang="en-CA" dirty="0" smtClean="0"/>
+          <a:p>
+            <a:r>
+              <a:rPr lang="en-CA" dirty="0"/>
+              <a:t>Software development methodology:</a:t>
+            </a:r>
+          </a:p>
+          <a:p>
+            <a:pPr algn="ctr">
+              <a:buNone/>
+            </a:pPr>
+            <a:r>
+              <a:rPr lang="en-CA" dirty="0"/>
+              <a:t>Waterfall </a:t>
+            </a:r>
+            <a:r>
+              <a:rPr lang="en-CA" dirty="0">
+                <a:sym typeface="Wingdings" pitchFamily="2" charset="2"/>
+              </a:rPr>
+              <a:t> Scrum</a:t>
+            </a:r>
+          </a:p>
+          <a:p>
+            <a:r>
+              <a:rPr lang="en-CA" dirty="0">
+                <a:sym typeface="Wingdings" pitchFamily="2" charset="2"/>
+              </a:rPr>
+              <a:t>Version control:</a:t>
+            </a:r>
+          </a:p>
+          <a:p>
+            <a:pPr algn="ctr">
+              <a:buNone/>
+            </a:pPr>
+            <a:r>
+              <a:rPr lang="en-CA" dirty="0">
+                <a:sym typeface="Wingdings" pitchFamily="2" charset="2"/>
+              </a:rPr>
+              <a:t>Manual maintenance  </a:t>
+            </a:r>
+            <a:r>
+              <a:rPr lang="en-CA" dirty="0" err="1">
+                <a:sym typeface="Wingdings" pitchFamily="2" charset="2"/>
+              </a:rPr>
+              <a:t>GitLab</a:t>
+            </a:r>
+            <a:r>
+              <a:rPr lang="en-CA" dirty="0">
+                <a:sym typeface="Wingdings" pitchFamily="2" charset="2"/>
+              </a:rPr>
+              <a:t> repository</a:t>
+            </a:r>
+            <a:endParaRPr lang="en-CA" dirty="0"/>
           </a:p>
           <a:p>
             <a:endParaRPr lang="en-CA" dirty="0"/>
@@ -4717,13 +4682,113 @@
   <p:clrMapOvr>
     <a:masterClrMapping/>
   </p:clrMapOvr>
-  <mc:AlternateContent xmlns:mc="http://schemas.openxmlformats.org/markup-compatibility/2006">
-    <mc:Choice xmlns:p14="http://schemas.microsoft.com/office/powerpoint/2010/main" xmlns="" Requires="p14">
+  <mc:AlternateContent xmlns:mc="http://schemas.openxmlformats.org/markup-compatibility/2006" xmlns:p14="http://schemas.microsoft.com/office/powerpoint/2010/main">
+    <mc:Choice Requires="p14">
       <p:transition spd="med" p14:dur="700">
         <p:fade/>
       </p:transition>
     </mc:Choice>
-    <mc:Fallback>
+    <mc:Fallback xmlns="">
+      <p:transition spd="med">
+        <p:fade/>
+      </p:transition>
+    </mc:Fallback>
+  </mc:AlternateContent>
+</p:sld>
+</file>
+
+<file path=ppt/slides/slide15.xml><?xml version="1.0" encoding="utf-8"?>
+<p:sld xmlns:a="http://schemas.openxmlformats.org/drawingml/2006/main" xmlns:r="http://schemas.openxmlformats.org/officeDocument/2006/relationships" xmlns:p="http://schemas.openxmlformats.org/presentationml/2006/main">
+  <p:cSld>
+    <p:spTree>
+      <p:nvGrpSpPr>
+        <p:cNvPr id="1" name=""/>
+        <p:cNvGrpSpPr/>
+        <p:nvPr/>
+      </p:nvGrpSpPr>
+      <p:grpSpPr>
+        <a:xfrm>
+          <a:off x="0" y="0"/>
+          <a:ext cx="0" cy="0"/>
+          <a:chOff x="0" y="0"/>
+          <a:chExt cx="0" cy="0"/>
+        </a:xfrm>
+      </p:grpSpPr>
+      <p:sp>
+        <p:nvSpPr>
+          <p:cNvPr id="2" name="Title 1"/>
+          <p:cNvSpPr>
+            <a:spLocks noGrp="1"/>
+          </p:cNvSpPr>
+          <p:nvPr>
+            <p:ph type="title"/>
+          </p:nvPr>
+        </p:nvSpPr>
+        <p:spPr/>
+        <p:txBody>
+          <a:bodyPr/>
+          <a:lstStyle/>
+          <a:p>
+            <a:pPr algn="r"/>
+            <a:r>
+              <a:rPr lang="en-CA" dirty="0"/>
+              <a:t>Improvements</a:t>
+            </a:r>
+          </a:p>
+        </p:txBody>
+      </p:sp>
+      <p:sp>
+        <p:nvSpPr>
+          <p:cNvPr id="3" name="Content Placeholder 2"/>
+          <p:cNvSpPr>
+            <a:spLocks noGrp="1"/>
+          </p:cNvSpPr>
+          <p:nvPr>
+            <p:ph idx="1"/>
+          </p:nvPr>
+        </p:nvSpPr>
+        <p:spPr/>
+        <p:txBody>
+          <a:bodyPr/>
+          <a:lstStyle/>
+          <a:p>
+            <a:r>
+              <a:rPr lang="en-CA" dirty="0"/>
+              <a:t>Scalable</a:t>
+            </a:r>
+          </a:p>
+          <a:p>
+            <a:r>
+              <a:rPr lang="en-CA" dirty="0"/>
+              <a:t>Better data: more information and outlook parameters</a:t>
+            </a:r>
+          </a:p>
+          <a:p>
+            <a:r>
+              <a:rPr lang="en-CA" dirty="0"/>
+              <a:t>Online service</a:t>
+            </a:r>
+          </a:p>
+          <a:p>
+            <a:endParaRPr lang="en-CA" dirty="0"/>
+          </a:p>
+          <a:p>
+            <a:endParaRPr lang="en-CA" dirty="0"/>
+          </a:p>
+        </p:txBody>
+      </p:sp>
+    </p:spTree>
+  </p:cSld>
+  <p:clrMapOvr>
+    <a:masterClrMapping/>
+  </p:clrMapOvr>
+  <mc:AlternateContent xmlns:mc="http://schemas.openxmlformats.org/markup-compatibility/2006" xmlns:p14="http://schemas.microsoft.com/office/powerpoint/2010/main">
+    <mc:Choice Requires="p14">
+      <p:transition spd="med" p14:dur="700">
+        <p:fade/>
+      </p:transition>
+    </mc:Choice>
+    <mc:Fallback xmlns="">
       <p:transition spd="med">
         <p:fade/>
       </p:transition>
@@ -4766,10 +4831,9 @@
           <a:p>
             <a:pPr algn="r"/>
             <a:r>
-              <a:rPr lang="en-US" dirty="0" smtClean="0"/>
+              <a:rPr lang="en-US" dirty="0"/>
               <a:t>Motivation</a:t>
             </a:r>
-            <a:endParaRPr lang="en-US" dirty="0"/>
           </a:p>
         </p:txBody>
       </p:sp>
@@ -4789,39 +4853,39 @@
           <a:lstStyle/>
           <a:p>
             <a:r>
-              <a:rPr lang="en-US" dirty="0" smtClean="0"/>
+              <a:rPr lang="en-US" dirty="0"/>
               <a:t>Target demographic: Job-seekers, especially new immigrants</a:t>
             </a:r>
           </a:p>
           <a:p>
             <a:r>
-              <a:rPr lang="en-US" dirty="0" smtClean="0"/>
+              <a:rPr lang="en-US" dirty="0"/>
               <a:t>Uses quantitative measure of job characteristics in a region</a:t>
             </a:r>
           </a:p>
           <a:p>
             <a:pPr lvl="1"/>
-            <a:endParaRPr lang="en-US" dirty="0" smtClean="0"/>
+            <a:endParaRPr lang="en-US" dirty="0"/>
           </a:p>
         </p:txBody>
       </p:sp>
     </p:spTree>
     <p:extLst>
       <p:ext uri="{BB962C8B-B14F-4D97-AF65-F5344CB8AC3E}">
-        <p14:creationId xmlns:p14="http://schemas.microsoft.com/office/powerpoint/2010/main" xmlns="" val="2139132589"/>
+        <p14:creationId xmlns:p14="http://schemas.microsoft.com/office/powerpoint/2010/main" val="2139132589"/>
       </p:ext>
     </p:extLst>
   </p:cSld>
   <p:clrMapOvr>
     <a:masterClrMapping/>
   </p:clrMapOvr>
-  <mc:AlternateContent xmlns:mc="http://schemas.openxmlformats.org/markup-compatibility/2006">
-    <mc:Choice xmlns:p14="http://schemas.microsoft.com/office/powerpoint/2010/main" xmlns="" Requires="p14">
+  <mc:AlternateContent xmlns:mc="http://schemas.openxmlformats.org/markup-compatibility/2006" xmlns:p14="http://schemas.microsoft.com/office/powerpoint/2010/main">
+    <mc:Choice Requires="p14">
       <p:transition spd="med" p14:dur="700">
         <p:fade/>
       </p:transition>
     </mc:Choice>
-    <mc:Fallback>
+    <mc:Fallback xmlns="">
       <p:transition spd="med">
         <p:fade/>
       </p:transition>
@@ -4864,10 +4928,9 @@
           <a:p>
             <a:pPr algn="r"/>
             <a:r>
-              <a:rPr lang="en-US" dirty="0" smtClean="0"/>
+              <a:rPr lang="en-US" dirty="0"/>
               <a:t>I/O</a:t>
             </a:r>
-            <a:endParaRPr lang="en-US" dirty="0"/>
           </a:p>
         </p:txBody>
       </p:sp>
@@ -4888,61 +4951,60 @@
           <a:p>
             <a:pPr lvl="1"/>
             <a:r>
-              <a:rPr lang="en-US" dirty="0" smtClean="0"/>
+              <a:rPr lang="en-US" dirty="0"/>
               <a:t>Inputs:</a:t>
             </a:r>
           </a:p>
           <a:p>
             <a:pPr lvl="2"/>
             <a:r>
-              <a:rPr lang="en-US" dirty="0" smtClean="0"/>
+              <a:rPr lang="en-US" dirty="0"/>
               <a:t>Job Name</a:t>
             </a:r>
           </a:p>
           <a:p>
             <a:pPr lvl="2"/>
             <a:r>
-              <a:rPr lang="en-US" dirty="0" smtClean="0"/>
+              <a:rPr lang="en-US" dirty="0"/>
               <a:t>Province</a:t>
             </a:r>
           </a:p>
           <a:p>
             <a:pPr lvl="2"/>
             <a:r>
-              <a:rPr lang="en-US" dirty="0" smtClean="0"/>
+              <a:rPr lang="en-US" dirty="0"/>
               <a:t>Income</a:t>
             </a:r>
           </a:p>
           <a:p>
             <a:pPr lvl="2"/>
-            <a:endParaRPr lang="en-US" dirty="0" smtClean="0"/>
+            <a:endParaRPr lang="en-US" dirty="0"/>
           </a:p>
           <a:p>
             <a:pPr marL="587375" lvl="1" indent="-342900"/>
             <a:r>
-              <a:rPr lang="en-US" dirty="0" smtClean="0"/>
+              <a:rPr lang="en-US" dirty="0"/>
               <a:t>Outputs:</a:t>
             </a:r>
           </a:p>
           <a:p>
             <a:pPr lvl="2"/>
             <a:r>
-              <a:rPr lang="en-US" dirty="0" smtClean="0"/>
+              <a:rPr lang="en-US" dirty="0"/>
               <a:t>Top 5 cities with ranked in order of job potential</a:t>
             </a:r>
           </a:p>
           <a:p>
             <a:pPr lvl="2"/>
             <a:r>
-              <a:rPr lang="en-US" dirty="0" smtClean="0"/>
+              <a:rPr lang="en-US" dirty="0"/>
               <a:t>Income level for the cities</a:t>
             </a:r>
-            <a:endParaRPr lang="en-US" dirty="0" smtClean="0"/>
           </a:p>
           <a:p>
             <a:pPr lvl="2"/>
             <a:r>
-              <a:rPr lang="en-US" dirty="0" smtClean="0"/>
+              <a:rPr lang="en-US" dirty="0"/>
               <a:t>Cities with similar potential, but higher income</a:t>
             </a:r>
           </a:p>
@@ -4951,32 +5013,25 @@
     </p:spTree>
     <p:extLst>
       <p:ext uri="{BB962C8B-B14F-4D97-AF65-F5344CB8AC3E}">
-        <p14:creationId xmlns:p14="http://schemas.microsoft.com/office/powerpoint/2010/main" xmlns="" val="2139132589"/>
+        <p14:creationId xmlns:p14="http://schemas.microsoft.com/office/powerpoint/2010/main" val="2139132589"/>
       </p:ext>
     </p:extLst>
   </p:cSld>
   <p:clrMapOvr>
     <a:masterClrMapping/>
   </p:clrMapOvr>
-  <mc:AlternateContent xmlns:mc="http://schemas.openxmlformats.org/markup-compatibility/2006">
-    <mc:Choice xmlns:p14="http://schemas.microsoft.com/office/powerpoint/2010/main" xmlns="" Requires="p14">
+  <mc:AlternateContent xmlns:mc="http://schemas.openxmlformats.org/markup-compatibility/2006" xmlns:p14="http://schemas.microsoft.com/office/powerpoint/2010/main">
+    <mc:Choice Requires="p14">
       <p:transition spd="med" p14:dur="700">
         <p:fade/>
       </p:transition>
     </mc:Choice>
-    <mc:Fallback>
+    <mc:Fallback xmlns="">
       <p:transition spd="med">
         <p:fade/>
       </p:transition>
     </mc:Fallback>
   </mc:AlternateContent>
-  <p:timing>
-    <p:tnLst>
-      <p:par>
-        <p:cTn id="1" dur="indefinite" restart="never" nodeType="tmRoot"/>
-      </p:par>
-    </p:tnLst>
-  </p:timing>
 </p:sld>
 </file>
 
@@ -5014,10 +5069,9 @@
           <a:p>
             <a:pPr algn="r"/>
             <a:r>
-              <a:rPr lang="en-US" dirty="0" smtClean="0"/>
+              <a:rPr lang="en-US" dirty="0"/>
               <a:t>Data sets</a:t>
             </a:r>
-            <a:endParaRPr lang="en-US" dirty="0"/>
           </a:p>
         </p:txBody>
       </p:sp>
@@ -5038,39 +5092,38 @@
           <a:p>
             <a:pPr lvl="1"/>
             <a:r>
-              <a:rPr lang="en-US" dirty="0" smtClean="0"/>
+              <a:rPr lang="en-US" dirty="0"/>
               <a:t>Job Outlook data set</a:t>
             </a:r>
           </a:p>
           <a:p>
             <a:pPr lvl="1"/>
-            <a:endParaRPr lang="en-US" dirty="0" smtClean="0"/>
+            <a:endParaRPr lang="en-US" dirty="0"/>
           </a:p>
           <a:p>
             <a:pPr lvl="1"/>
-            <a:endParaRPr lang="en-US" dirty="0" smtClean="0"/>
+            <a:endParaRPr lang="en-US" dirty="0"/>
           </a:p>
           <a:p>
             <a:pPr lvl="1"/>
-            <a:endParaRPr lang="en-US" dirty="0" smtClean="0"/>
+            <a:endParaRPr lang="en-US" dirty="0"/>
           </a:p>
           <a:p>
             <a:pPr lvl="1">
               <a:buNone/>
             </a:pPr>
-            <a:endParaRPr lang="en-US" dirty="0" smtClean="0"/>
+            <a:endParaRPr lang="en-US" dirty="0"/>
           </a:p>
           <a:p>
             <a:pPr lvl="1"/>
             <a:r>
-              <a:rPr lang="en-US" dirty="0" smtClean="0"/>
+              <a:rPr lang="en-US" dirty="0"/>
               <a:t>Income data set</a:t>
             </a:r>
-            <a:endParaRPr lang="en-US" dirty="0" smtClean="0"/>
           </a:p>
           <a:p>
             <a:pPr lvl="1"/>
-            <a:endParaRPr lang="en-US" dirty="0" smtClean="0"/>
+            <a:endParaRPr lang="en-US" dirty="0"/>
           </a:p>
         </p:txBody>
       </p:sp>
@@ -5141,32 +5194,25 @@
     </p:spTree>
     <p:extLst>
       <p:ext uri="{BB962C8B-B14F-4D97-AF65-F5344CB8AC3E}">
-        <p14:creationId xmlns:p14="http://schemas.microsoft.com/office/powerpoint/2010/main" xmlns="" val="2139132589"/>
+        <p14:creationId xmlns:p14="http://schemas.microsoft.com/office/powerpoint/2010/main" val="2139132589"/>
       </p:ext>
     </p:extLst>
   </p:cSld>
   <p:clrMapOvr>
     <a:masterClrMapping/>
   </p:clrMapOvr>
-  <mc:AlternateContent xmlns:mc="http://schemas.openxmlformats.org/markup-compatibility/2006">
-    <mc:Choice xmlns:p14="http://schemas.microsoft.com/office/powerpoint/2010/main" xmlns="" Requires="p14">
+  <mc:AlternateContent xmlns:mc="http://schemas.openxmlformats.org/markup-compatibility/2006" xmlns:p14="http://schemas.microsoft.com/office/powerpoint/2010/main">
+    <mc:Choice Requires="p14">
       <p:transition spd="med" p14:dur="700">
         <p:fade/>
       </p:transition>
     </mc:Choice>
-    <mc:Fallback>
+    <mc:Fallback xmlns="">
       <p:transition spd="med">
         <p:fade/>
       </p:transition>
     </mc:Fallback>
   </mc:AlternateContent>
-  <p:timing>
-    <p:tnLst>
-      <p:par>
-        <p:cTn id="1" dur="indefinite" restart="never" nodeType="tmRoot"/>
-      </p:par>
-    </p:tnLst>
-  </p:timing>
 </p:sld>
 </file>
 
@@ -5224,13 +5270,13 @@
   <p:clrMapOvr>
     <a:masterClrMapping/>
   </p:clrMapOvr>
-  <mc:AlternateContent xmlns:mc="http://schemas.openxmlformats.org/markup-compatibility/2006">
-    <mc:Choice xmlns:p14="http://schemas.microsoft.com/office/powerpoint/2010/main" xmlns="" Requires="p14">
+  <mc:AlternateContent xmlns:mc="http://schemas.openxmlformats.org/markup-compatibility/2006" xmlns:p14="http://schemas.microsoft.com/office/powerpoint/2010/main">
+    <mc:Choice Requires="p14">
       <p:transition spd="med" p14:dur="700">
         <p:fade/>
       </p:transition>
     </mc:Choice>
-    <mc:Fallback>
+    <mc:Fallback xmlns="">
       <p:transition spd="med">
         <p:fade/>
       </p:transition>
@@ -5278,10 +5324,9 @@
           <a:p>
             <a:pPr algn="ctr"/>
             <a:r>
-              <a:rPr lang="en-CA" dirty="0" smtClean="0"/>
+              <a:rPr lang="en-CA" dirty="0"/>
               <a:t>Prototype Demonstration</a:t>
             </a:r>
-            <a:endParaRPr lang="en-CA" dirty="0"/>
           </a:p>
         </p:txBody>
       </p:sp>
@@ -5290,13 +5335,13 @@
   <p:clrMapOvr>
     <a:masterClrMapping/>
   </p:clrMapOvr>
-  <mc:AlternateContent xmlns:mc="http://schemas.openxmlformats.org/markup-compatibility/2006">
-    <mc:Choice xmlns:p14="http://schemas.microsoft.com/office/powerpoint/2010/main" xmlns="" Requires="p14">
+  <mc:AlternateContent xmlns:mc="http://schemas.openxmlformats.org/markup-compatibility/2006" xmlns:p14="http://schemas.microsoft.com/office/powerpoint/2010/main">
+    <mc:Choice Requires="p14">
       <p:transition spd="med" p14:dur="700">
         <p:fade/>
       </p:transition>
     </mc:Choice>
-    <mc:Fallback>
+    <mc:Fallback xmlns="">
       <p:transition spd="med">
         <p:fade/>
       </p:transition>
@@ -5344,10 +5389,9 @@
           <a:p>
             <a:pPr algn="r"/>
             <a:r>
-              <a:rPr lang="en-US" dirty="0" smtClean="0"/>
+              <a:rPr lang="en-US" dirty="0"/>
               <a:t>Data Structures</a:t>
             </a:r>
-            <a:endParaRPr lang="en-US" dirty="0"/>
           </a:p>
         </p:txBody>
       </p:sp>
@@ -5386,32 +5430,25 @@
     </p:spTree>
     <p:extLst>
       <p:ext uri="{BB962C8B-B14F-4D97-AF65-F5344CB8AC3E}">
-        <p14:creationId xmlns:p14="http://schemas.microsoft.com/office/powerpoint/2010/main" xmlns="" val="3106206852"/>
+        <p14:creationId xmlns:p14="http://schemas.microsoft.com/office/powerpoint/2010/main" val="3106206852"/>
       </p:ext>
     </p:extLst>
   </p:cSld>
   <p:clrMapOvr>
     <a:masterClrMapping/>
   </p:clrMapOvr>
-  <mc:AlternateContent xmlns:mc="http://schemas.openxmlformats.org/markup-compatibility/2006">
-    <mc:Choice xmlns:p14="http://schemas.microsoft.com/office/powerpoint/2010/main" xmlns="" Requires="p14">
+  <mc:AlternateContent xmlns:mc="http://schemas.openxmlformats.org/markup-compatibility/2006" xmlns:p14="http://schemas.microsoft.com/office/powerpoint/2010/main">
+    <mc:Choice Requires="p14">
       <p:transition spd="med" p14:dur="700">
         <p:fade/>
       </p:transition>
     </mc:Choice>
-    <mc:Fallback>
+    <mc:Fallback xmlns="">
       <p:transition spd="med">
         <p:fade/>
       </p:transition>
     </mc:Fallback>
   </mc:AlternateContent>
-  <p:timing>
-    <p:tnLst>
-      <p:par>
-        <p:cTn id="1" dur="indefinite" restart="never" nodeType="tmRoot"/>
-      </p:par>
-    </p:tnLst>
-  </p:timing>
 </p:sld>
 </file>
 
@@ -5449,10 +5486,9 @@
           <a:p>
             <a:pPr algn="r"/>
             <a:r>
-              <a:rPr lang="en-US" dirty="0" smtClean="0"/>
+              <a:rPr lang="en-US" dirty="0"/>
               <a:t>Sorting and Searching Algorithms</a:t>
             </a:r>
-            <a:endParaRPr lang="en-US" dirty="0"/>
           </a:p>
         </p:txBody>
       </p:sp>
@@ -5472,48 +5508,40 @@
           <a:lstStyle/>
           <a:p>
             <a:r>
-              <a:rPr lang="en-US" dirty="0" smtClean="0"/>
+              <a:rPr lang="en-US" dirty="0"/>
               <a:t>Sort: Merge Sort</a:t>
             </a:r>
           </a:p>
           <a:p>
             <a:r>
-              <a:rPr lang="en-US" dirty="0" smtClean="0"/>
+              <a:rPr lang="en-US" dirty="0"/>
               <a:t>Search: Linear</a:t>
             </a:r>
-            <a:endParaRPr lang="en-US" dirty="0"/>
           </a:p>
         </p:txBody>
       </p:sp>
     </p:spTree>
     <p:extLst>
       <p:ext uri="{BB962C8B-B14F-4D97-AF65-F5344CB8AC3E}">
-        <p14:creationId xmlns:p14="http://schemas.microsoft.com/office/powerpoint/2010/main" xmlns="" val="4206988261"/>
+        <p14:creationId xmlns:p14="http://schemas.microsoft.com/office/powerpoint/2010/main" val="4206988261"/>
       </p:ext>
     </p:extLst>
   </p:cSld>
   <p:clrMapOvr>
     <a:masterClrMapping/>
   </p:clrMapOvr>
-  <mc:AlternateContent xmlns:mc="http://schemas.openxmlformats.org/markup-compatibility/2006">
-    <mc:Choice xmlns:p14="http://schemas.microsoft.com/office/powerpoint/2010/main" xmlns="" Requires="p14">
+  <mc:AlternateContent xmlns:mc="http://schemas.openxmlformats.org/markup-compatibility/2006" xmlns:p14="http://schemas.microsoft.com/office/powerpoint/2010/main">
+    <mc:Choice Requires="p14">
       <p:transition spd="med" p14:dur="700">
         <p:fade/>
       </p:transition>
     </mc:Choice>
-    <mc:Fallback>
+    <mc:Fallback xmlns="">
       <p:transition spd="med">
         <p:fade/>
       </p:transition>
     </mc:Fallback>
   </mc:AlternateContent>
-  <p:timing>
-    <p:tnLst>
-      <p:par>
-        <p:cTn id="1" dur="indefinite" restart="never" nodeType="tmRoot"/>
-      </p:par>
-    </p:tnLst>
-  </p:timing>
 </p:sld>
 </file>
 
@@ -5551,10 +5579,9 @@
           <a:p>
             <a:pPr algn="r"/>
             <a:r>
-              <a:rPr lang="en-US" dirty="0" smtClean="0"/>
+              <a:rPr lang="en-US" dirty="0"/>
               <a:t>Graph Algorithm</a:t>
             </a:r>
-            <a:endParaRPr lang="en-US" dirty="0"/>
           </a:p>
         </p:txBody>
       </p:sp>
@@ -5581,40 +5608,32 @@
           <a:lstStyle/>
           <a:p>
             <a:r>
-              <a:rPr lang="en-CA" dirty="0" smtClean="0"/>
-              <a:t>Takes an </a:t>
-            </a:r>
-            <a:r>
-              <a:rPr lang="en-CA" dirty="0" smtClean="0"/>
-              <a:t>array </a:t>
-            </a:r>
-            <a:r>
-              <a:rPr lang="en-CA" dirty="0" smtClean="0"/>
-              <a:t>of cities</a:t>
+              <a:rPr lang="en-CA" dirty="0"/>
+              <a:t>Takes an array of cities</a:t>
             </a:r>
           </a:p>
           <a:p>
             <a:pPr algn="just"/>
             <a:r>
-              <a:rPr lang="en-CA" dirty="0" smtClean="0"/>
+              <a:rPr lang="en-CA" dirty="0"/>
               <a:t>Constructs an undirected graph using these cities</a:t>
             </a:r>
           </a:p>
           <a:p>
             <a:r>
-              <a:rPr lang="en-CA" dirty="0" smtClean="0"/>
+              <a:rPr lang="en-CA" dirty="0"/>
               <a:t>Core of graph is linked “dummy” nodes for each outlook</a:t>
             </a:r>
           </a:p>
           <a:p>
             <a:r>
-              <a:rPr lang="en-CA" dirty="0" smtClean="0"/>
+              <a:rPr lang="en-CA" dirty="0"/>
               <a:t>Cities are clustered around these outlook nodes based on their outlook</a:t>
             </a:r>
           </a:p>
           <a:p>
             <a:r>
-              <a:rPr lang="en-CA" dirty="0" smtClean="0"/>
+              <a:rPr lang="en-CA" dirty="0"/>
               <a:t>Edges are weighted by city income</a:t>
             </a:r>
           </a:p>
@@ -5623,32 +5642,25 @@
     </p:spTree>
     <p:extLst>
       <p:ext uri="{BB962C8B-B14F-4D97-AF65-F5344CB8AC3E}">
-        <p14:creationId xmlns:p14="http://schemas.microsoft.com/office/powerpoint/2010/main" xmlns="" val="4206988261"/>
+        <p14:creationId xmlns:p14="http://schemas.microsoft.com/office/powerpoint/2010/main" val="4206988261"/>
       </p:ext>
     </p:extLst>
   </p:cSld>
   <p:clrMapOvr>
     <a:masterClrMapping/>
   </p:clrMapOvr>
-  <mc:AlternateContent xmlns:mc="http://schemas.openxmlformats.org/markup-compatibility/2006">
-    <mc:Choice xmlns:p14="http://schemas.microsoft.com/office/powerpoint/2010/main" xmlns="" Requires="p14">
+  <mc:AlternateContent xmlns:mc="http://schemas.openxmlformats.org/markup-compatibility/2006" xmlns:p14="http://schemas.microsoft.com/office/powerpoint/2010/main">
+    <mc:Choice Requires="p14">
       <p:transition spd="med" p14:dur="700">
         <p:fade/>
       </p:transition>
     </mc:Choice>
-    <mc:Fallback>
+    <mc:Fallback xmlns="">
       <p:transition spd="med">
         <p:fade/>
       </p:transition>
     </mc:Fallback>
   </mc:AlternateContent>
-  <p:timing>
-    <p:tnLst>
-      <p:par>
-        <p:cTn id="1" dur="indefinite" restart="never" nodeType="tmRoot"/>
-      </p:par>
-    </p:tnLst>
-  </p:timing>
 </p:sld>
 </file>
 
@@ -5913,7 +5925,7 @@
   <a:extraClrSchemeLst/>
   <a:extLst>
     <a:ext uri="{05A4C25C-085E-4340-85A3-A5531E510DB2}">
-      <thm15:themeFamily xmlns:thm15="http://schemas.microsoft.com/office/thememl/2012/main" xmlns="" name="TF02895261.potx" id="{03C5CF44-0C62-41B4-B3EA-416B4807878A}" vid="{EC3ACB92-700E-4167-B3A6-412DE40A64C2}"/>
+      <thm15:themeFamily xmlns:thm15="http://schemas.microsoft.com/office/thememl/2012/main" name="TF02895261.potx" id="{03C5CF44-0C62-41B4-B3EA-416B4807878A}" vid="{EC3ACB92-700E-4167-B3A6-412DE40A64C2}"/>
     </a:ext>
   </a:extLst>
 </a:theme>
@@ -6432,15 +6444,6 @@
 </file>
 
 <file path=customXml/item1.xml><?xml version="1.0" encoding="utf-8"?>
-<?mso-contentType ?>
-<FormTemplates xmlns="http://schemas.microsoft.com/sharepoint/v3/contenttype/forms">
-  <Display>DocumentLibraryForm</Display>
-  <Edit>AssetEditForm</Edit>
-  <New>DocumentLibraryForm</New>
-</FormTemplates>
-</file>
-
-<file path=customXml/item2.xml><?xml version="1.0" encoding="utf-8"?>
 <p:properties xmlns:p="http://schemas.microsoft.com/office/2006/metadata/properties" xmlns:xsi="http://www.w3.org/2001/XMLSchema-instance" xmlns:pc="http://schemas.microsoft.com/office/infopath/2007/PartnerControls">
   <documentManagement>
     <DirectSourceMarket xmlns="4873beb7-5857-4685-be1f-d57550cc96cc" xsi:nil="true"/>
@@ -6565,6 +6568,15 @@
     <LocMarketGroupTiers2 xmlns="4873beb7-5857-4685-be1f-d57550cc96cc" xsi:nil="true"/>
   </documentManagement>
 </p:properties>
+</file>
+
+<file path=customXml/item2.xml><?xml version="1.0" encoding="utf-8"?>
+<?mso-contentType ?>
+<FormTemplates xmlns="http://schemas.microsoft.com/sharepoint/v3/contenttype/forms">
+  <Display>DocumentLibraryForm</Display>
+  <Edit>AssetEditForm</Edit>
+  <New>DocumentLibraryForm</New>
+</FormTemplates>
 </file>
 
 <file path=customXml/item3.xml><?xml version="1.0" encoding="utf-8"?>
@@ -7608,14 +7620,6 @@
 </file>
 
 <file path=customXml/itemProps1.xml><?xml version="1.0" encoding="utf-8"?>
-<ds:datastoreItem xmlns:ds="http://schemas.openxmlformats.org/officeDocument/2006/customXml" ds:itemID="{74228E6B-D70C-44BB-A81F-A245495F612B}">
-  <ds:schemaRefs>
-    <ds:schemaRef ds:uri="http://schemas.microsoft.com/sharepoint/v3/contenttype/forms"/>
-  </ds:schemaRefs>
-</ds:datastoreItem>
-</file>
-
-<file path=customXml/itemProps2.xml><?xml version="1.0" encoding="utf-8"?>
 <ds:datastoreItem xmlns:ds="http://schemas.openxmlformats.org/officeDocument/2006/customXml" ds:itemID="{00E41224-0370-4595-877C-23316CD80004}">
   <ds:schemaRefs>
     <ds:schemaRef ds:uri="http://purl.org/dc/terms/"/>
@@ -7627,6 +7631,14 @@
     <ds:schemaRef ds:uri="http://schemas.microsoft.com/office/infopath/2007/PartnerControls"/>
     <ds:schemaRef ds:uri="http://www.w3.org/XML/1998/namespace"/>
     <ds:schemaRef ds:uri="http://purl.org/dc/dcmitype/"/>
+  </ds:schemaRefs>
+</ds:datastoreItem>
+</file>
+
+<file path=customXml/itemProps2.xml><?xml version="1.0" encoding="utf-8"?>
+<ds:datastoreItem xmlns:ds="http://schemas.openxmlformats.org/officeDocument/2006/customXml" ds:itemID="{74228E6B-D70C-44BB-A81F-A245495F612B}">
+  <ds:schemaRefs>
+    <ds:schemaRef ds:uri="http://schemas.microsoft.com/sharepoint/v3/contenttype/forms"/>
   </ds:schemaRefs>
 </ds:datastoreItem>
 </file>

</xml_diff>